<commit_message>
added changes right before class
</commit_message>
<xml_diff>
--- a/Portfolio Strategy Project.pptx
+++ b/Portfolio Strategy Project.pptx
@@ -13,9 +13,9 @@
   <p:sldIdLst>
     <p:sldId id="256" r:id="rId2"/>
     <p:sldId id="286" r:id="rId3"/>
-    <p:sldId id="287" r:id="rId4"/>
-    <p:sldId id="282" r:id="rId5"/>
-    <p:sldId id="272" r:id="rId6"/>
+    <p:sldId id="282" r:id="rId4"/>
+    <p:sldId id="272" r:id="rId5"/>
+    <p:sldId id="291" r:id="rId6"/>
     <p:sldId id="288" r:id="rId7"/>
     <p:sldId id="289" r:id="rId8"/>
   </p:sldIdLst>
@@ -4321,62 +4321,6 @@
           </a:p>
         </p:txBody>
       </p:sp>
-      <p:pic>
-        <p:nvPicPr>
-          <p:cNvPr id="1026" name="Picture 2"/>
-          <p:cNvPicPr>
-            <a:picLocks noGrp="1" noChangeAspect="1" noChangeArrowheads="1"/>
-          </p:cNvPicPr>
-          <p:nvPr>
-            <p:ph idx="1"/>
-          </p:nvPr>
-        </p:nvPicPr>
-        <p:blipFill>
-          <a:blip r:embed="rId2">
-            <a:extLst>
-              <a:ext uri="{28A0092B-C50C-407E-A947-70E740481C1C}">
-                <a14:useLocalDpi xmlns:a14="http://schemas.microsoft.com/office/drawing/2010/main" val="0"/>
-              </a:ext>
-            </a:extLst>
-          </a:blip>
-          <a:srcRect/>
-          <a:stretch>
-            <a:fillRect/>
-          </a:stretch>
-        </p:blipFill>
-        <p:spPr bwMode="auto">
-          <a:xfrm>
-            <a:off x="1634110" y="1860492"/>
-            <a:ext cx="5875779" cy="4396048"/>
-          </a:xfrm>
-          <a:prstGeom prst="rect">
-            <a:avLst/>
-          </a:prstGeom>
-          <a:noFill/>
-          <a:ln>
-            <a:noFill/>
-          </a:ln>
-          <a:extLst>
-            <a:ext uri="{909E8E84-426E-40DD-AFC4-6F175D3DCCD1}">
-              <a14:hiddenFill xmlns:a14="http://schemas.microsoft.com/office/drawing/2010/main">
-                <a:solidFill>
-                  <a:schemeClr val="accent1"/>
-                </a:solidFill>
-              </a14:hiddenFill>
-            </a:ext>
-            <a:ext uri="{91240B29-F687-4F45-9708-019B960494DF}">
-              <a14:hiddenLine xmlns:a14="http://schemas.microsoft.com/office/drawing/2010/main" w="9525">
-                <a:solidFill>
-                  <a:schemeClr val="tx1"/>
-                </a:solidFill>
-                <a:miter lim="800000"/>
-                <a:headEnd/>
-                <a:tailEnd/>
-              </a14:hiddenLine>
-            </a:ext>
-          </a:extLst>
-        </p:spPr>
-      </p:pic>
       <p:sp>
         <p:nvSpPr>
           <p:cNvPr id="5" name="TextBox 4"/>
@@ -4410,6 +4354,42 @@
           </a:p>
         </p:txBody>
       </p:sp>
+      <p:pic>
+        <p:nvPicPr>
+          <p:cNvPr id="7" name="Picture 6">
+            <a:extLst>
+              <a:ext uri="{FF2B5EF4-FFF2-40B4-BE49-F238E27FC236}">
+                <a16:creationId xmlns:a16="http://schemas.microsoft.com/office/drawing/2014/main" id="{93E30483-7B07-8544-B732-6C8E276500AB}"/>
+              </a:ext>
+            </a:extLst>
+          </p:cNvPr>
+          <p:cNvPicPr>
+            <a:picLocks noChangeAspect="1"/>
+          </p:cNvPicPr>
+          <p:nvPr/>
+        </p:nvPicPr>
+        <p:blipFill>
+          <a:blip r:embed="rId2">
+            <a:extLst>
+              <a:ext uri="{28A0092B-C50C-407E-A947-70E740481C1C}">
+                <a14:useLocalDpi xmlns:a14="http://schemas.microsoft.com/office/drawing/2010/main" val="0"/>
+              </a:ext>
+            </a:extLst>
+          </a:blip>
+          <a:stretch>
+            <a:fillRect/>
+          </a:stretch>
+        </p:blipFill>
+        <p:spPr>
+          <a:xfrm>
+            <a:off x="1565450" y="1816100"/>
+            <a:ext cx="6683350" cy="4432300"/>
+          </a:xfrm>
+          <a:prstGeom prst="rect">
+            <a:avLst/>
+          </a:prstGeom>
+        </p:spPr>
+      </p:pic>
     </p:spTree>
     <p:extLst>
       <p:ext uri="{BB962C8B-B14F-4D97-AF65-F5344CB8AC3E}">
@@ -4424,110 +4404,6 @@
 </file>
 
 <file path=ppt/slides/slide3.xml><?xml version="1.0" encoding="utf-8"?>
-<p:sld xmlns:a="http://schemas.openxmlformats.org/drawingml/2006/main" xmlns:r="http://schemas.openxmlformats.org/officeDocument/2006/relationships" xmlns:p="http://schemas.openxmlformats.org/presentationml/2006/main">
-  <p:cSld>
-    <p:spTree>
-      <p:nvGrpSpPr>
-        <p:cNvPr id="1" name=""/>
-        <p:cNvGrpSpPr/>
-        <p:nvPr/>
-      </p:nvGrpSpPr>
-      <p:grpSpPr>
-        <a:xfrm>
-          <a:off x="0" y="0"/>
-          <a:ext cx="0" cy="0"/>
-          <a:chOff x="0" y="0"/>
-          <a:chExt cx="0" cy="0"/>
-        </a:xfrm>
-      </p:grpSpPr>
-      <p:sp>
-        <p:nvSpPr>
-          <p:cNvPr id="2" name="Title 1"/>
-          <p:cNvSpPr>
-            <a:spLocks noGrp="1"/>
-          </p:cNvSpPr>
-          <p:nvPr>
-            <p:ph type="title"/>
-          </p:nvPr>
-        </p:nvSpPr>
-        <p:spPr/>
-        <p:txBody>
-          <a:bodyPr/>
-          <a:lstStyle/>
-          <a:p>
-            <a:pPr algn="l"/>
-            <a:r>
-              <a:rPr lang="en-US" dirty="0"/>
-              <a:t>Seeking Alpha: Overview of Returns</a:t>
-            </a:r>
-          </a:p>
-        </p:txBody>
-      </p:sp>
-      <p:sp>
-        <p:nvSpPr>
-          <p:cNvPr id="3" name="Content Placeholder 2"/>
-          <p:cNvSpPr>
-            <a:spLocks noGrp="1"/>
-          </p:cNvSpPr>
-          <p:nvPr>
-            <p:ph idx="1"/>
-          </p:nvPr>
-        </p:nvSpPr>
-        <p:spPr/>
-        <p:txBody>
-          <a:bodyPr/>
-          <a:lstStyle/>
-          <a:p>
-            <a:pPr marL="0" indent="0">
-              <a:buNone/>
-            </a:pPr>
-            <a:endParaRPr lang="en-US" dirty="0"/>
-          </a:p>
-        </p:txBody>
-      </p:sp>
-      <p:sp>
-        <p:nvSpPr>
-          <p:cNvPr id="4" name="Slide Number Placeholder 3"/>
-          <p:cNvSpPr>
-            <a:spLocks noGrp="1"/>
-          </p:cNvSpPr>
-          <p:nvPr>
-            <p:ph type="sldNum" sz="quarter" idx="10"/>
-          </p:nvPr>
-        </p:nvSpPr>
-        <p:spPr/>
-        <p:txBody>
-          <a:bodyPr/>
-          <a:lstStyle/>
-          <a:p>
-            <a:pPr>
-              <a:defRPr/>
-            </a:pPr>
-            <a:fld id="{8477AC55-169F-48BF-899E-DC616324E2CF}" type="slidenum">
-              <a:rPr lang="en-US" smtClean="0"/>
-              <a:pPr>
-                <a:defRPr/>
-              </a:pPr>
-              <a:t>2</a:t>
-            </a:fld>
-            <a:endParaRPr lang="en-US" dirty="0"/>
-          </a:p>
-        </p:txBody>
-      </p:sp>
-    </p:spTree>
-    <p:extLst>
-      <p:ext uri="{BB962C8B-B14F-4D97-AF65-F5344CB8AC3E}">
-        <p14:creationId xmlns:p14="http://schemas.microsoft.com/office/powerpoint/2010/main" val="566820952"/>
-      </p:ext>
-    </p:extLst>
-  </p:cSld>
-  <p:clrMapOvr>
-    <a:masterClrMapping/>
-  </p:clrMapOvr>
-</p:sld>
-</file>
-
-<file path=ppt/slides/slide4.xml><?xml version="1.0" encoding="utf-8"?>
 <p:sld xmlns:a="http://schemas.openxmlformats.org/drawingml/2006/main" xmlns:r="http://schemas.openxmlformats.org/officeDocument/2006/relationships" xmlns:p="http://schemas.openxmlformats.org/presentationml/2006/main">
   <p:cSld>
     <p:spTree>
@@ -4791,6 +4667,42 @@
           </a:p>
         </p:txBody>
       </p:sp>
+      <p:pic>
+        <p:nvPicPr>
+          <p:cNvPr id="4" name="Picture 3">
+            <a:extLst>
+              <a:ext uri="{FF2B5EF4-FFF2-40B4-BE49-F238E27FC236}">
+                <a16:creationId xmlns:a16="http://schemas.microsoft.com/office/drawing/2014/main" id="{A1C41500-5BF9-F542-BABA-6F1E514A6552}"/>
+              </a:ext>
+            </a:extLst>
+          </p:cNvPr>
+          <p:cNvPicPr>
+            <a:picLocks noChangeAspect="1"/>
+          </p:cNvPicPr>
+          <p:nvPr/>
+        </p:nvPicPr>
+        <p:blipFill>
+          <a:blip r:embed="rId2">
+            <a:extLst>
+              <a:ext uri="{28A0092B-C50C-407E-A947-70E740481C1C}">
+                <a14:useLocalDpi xmlns:a14="http://schemas.microsoft.com/office/drawing/2010/main" val="0"/>
+              </a:ext>
+            </a:extLst>
+          </a:blip>
+          <a:stretch>
+            <a:fillRect/>
+          </a:stretch>
+        </p:blipFill>
+        <p:spPr>
+          <a:xfrm>
+            <a:off x="495300" y="2590800"/>
+            <a:ext cx="7937500" cy="3670300"/>
+          </a:xfrm>
+          <a:prstGeom prst="rect">
+            <a:avLst/>
+          </a:prstGeom>
+        </p:spPr>
+      </p:pic>
     </p:spTree>
     <p:extLst>
       <p:ext uri="{BB962C8B-B14F-4D97-AF65-F5344CB8AC3E}">
@@ -4804,7 +4716,7 @@
 </p:sld>
 </file>
 
-<file path=ppt/slides/slide5.xml><?xml version="1.0" encoding="utf-8"?>
+<file path=ppt/slides/slide4.xml><?xml version="1.0" encoding="utf-8"?>
 <p:sld xmlns:a="http://schemas.openxmlformats.org/drawingml/2006/main" xmlns:r="http://schemas.openxmlformats.org/officeDocument/2006/relationships" xmlns:p="http://schemas.openxmlformats.org/presentationml/2006/main">
   <p:cSld>
     <p:spTree>
@@ -5072,10 +4984,351 @@
           </a:p>
         </p:txBody>
       </p:sp>
+      <p:pic>
+        <p:nvPicPr>
+          <p:cNvPr id="4" name="Picture 3">
+            <a:extLst>
+              <a:ext uri="{FF2B5EF4-FFF2-40B4-BE49-F238E27FC236}">
+                <a16:creationId xmlns:a16="http://schemas.microsoft.com/office/drawing/2014/main" id="{25F25CB8-5755-4044-B3D5-852F898F13EA}"/>
+              </a:ext>
+            </a:extLst>
+          </p:cNvPr>
+          <p:cNvPicPr>
+            <a:picLocks noChangeAspect="1"/>
+          </p:cNvPicPr>
+          <p:nvPr/>
+        </p:nvPicPr>
+        <p:blipFill>
+          <a:blip r:embed="rId2">
+            <a:extLst>
+              <a:ext uri="{28A0092B-C50C-407E-A947-70E740481C1C}">
+                <a14:useLocalDpi xmlns:a14="http://schemas.microsoft.com/office/drawing/2010/main" val="0"/>
+              </a:ext>
+            </a:extLst>
+          </a:blip>
+          <a:stretch>
+            <a:fillRect/>
+          </a:stretch>
+        </p:blipFill>
+        <p:spPr>
+          <a:xfrm>
+            <a:off x="38100" y="2514600"/>
+            <a:ext cx="9144000" cy="3951449"/>
+          </a:xfrm>
+          <a:prstGeom prst="rect">
+            <a:avLst/>
+          </a:prstGeom>
+        </p:spPr>
+      </p:pic>
     </p:spTree>
     <p:extLst>
       <p:ext uri="{BB962C8B-B14F-4D97-AF65-F5344CB8AC3E}">
         <p14:creationId xmlns:p14="http://schemas.microsoft.com/office/powerpoint/2010/main" val="3704355971"/>
+      </p:ext>
+    </p:extLst>
+  </p:cSld>
+  <p:clrMapOvr>
+    <a:masterClrMapping/>
+  </p:clrMapOvr>
+</p:sld>
+</file>
+
+<file path=ppt/slides/slide5.xml><?xml version="1.0" encoding="utf-8"?>
+<p:sld xmlns:a="http://schemas.openxmlformats.org/drawingml/2006/main" xmlns:r="http://schemas.openxmlformats.org/officeDocument/2006/relationships" xmlns:p="http://schemas.openxmlformats.org/presentationml/2006/main">
+  <p:cSld>
+    <p:spTree>
+      <p:nvGrpSpPr>
+        <p:cNvPr id="1" name=""/>
+        <p:cNvGrpSpPr/>
+        <p:nvPr/>
+      </p:nvGrpSpPr>
+      <p:grpSpPr>
+        <a:xfrm>
+          <a:off x="0" y="0"/>
+          <a:ext cx="0" cy="0"/>
+          <a:chOff x="0" y="0"/>
+          <a:chExt cx="0" cy="0"/>
+        </a:xfrm>
+      </p:grpSpPr>
+      <p:sp>
+        <p:nvSpPr>
+          <p:cNvPr id="2" name="Title 1"/>
+          <p:cNvSpPr>
+            <a:spLocks noGrp="1"/>
+          </p:cNvSpPr>
+          <p:nvPr>
+            <p:ph type="title"/>
+          </p:nvPr>
+        </p:nvSpPr>
+        <p:spPr/>
+        <p:txBody>
+          <a:bodyPr>
+            <a:normAutofit/>
+          </a:bodyPr>
+          <a:lstStyle/>
+          <a:p>
+            <a:pPr algn="l"/>
+            <a:r>
+              <a:rPr lang="en-US" sz="2800" dirty="0"/>
+              <a:t>Highest Performing Months Compared to Lowest Performing</a:t>
+            </a:r>
+          </a:p>
+        </p:txBody>
+      </p:sp>
+      <p:sp>
+        <p:nvSpPr>
+          <p:cNvPr id="6" name="Title 1">
+            <a:extLst>
+              <a:ext uri="{FF2B5EF4-FFF2-40B4-BE49-F238E27FC236}">
+                <a16:creationId xmlns:a16="http://schemas.microsoft.com/office/drawing/2014/main" id="{6D7F4553-3269-2C42-A862-F53947A229D2}"/>
+              </a:ext>
+            </a:extLst>
+          </p:cNvPr>
+          <p:cNvSpPr txBox="1">
+            <a:spLocks/>
+          </p:cNvSpPr>
+          <p:nvPr/>
+        </p:nvSpPr>
+        <p:spPr bwMode="auto">
+          <a:xfrm>
+            <a:off x="457200" y="1036834"/>
+            <a:ext cx="8229600" cy="1066800"/>
+          </a:xfrm>
+          <a:prstGeom prst="rect">
+            <a:avLst/>
+          </a:prstGeom>
+          <a:noFill/>
+          <a:ln w="9525">
+            <a:noFill/>
+            <a:miter lim="800000"/>
+            <a:headEnd/>
+            <a:tailEnd/>
+          </a:ln>
+          <a:effectLst>
+            <a:outerShdw blurRad="50800" dist="38100" dir="5400000" algn="t" rotWithShape="0">
+              <a:prstClr val="black">
+                <a:alpha val="40000"/>
+              </a:prstClr>
+            </a:outerShdw>
+          </a:effectLst>
+        </p:spPr>
+        <p:txBody>
+          <a:bodyPr vert="horz" wrap="square" lIns="91440" tIns="45720" rIns="91440" bIns="45720" numCol="1" anchor="ctr" anchorCtr="0" compatLnSpc="1">
+            <a:prstTxWarp prst="textNoShape">
+              <a:avLst/>
+            </a:prstTxWarp>
+            <a:normAutofit/>
+          </a:bodyPr>
+          <a:lstStyle>
+            <a:lvl1pPr algn="ctr" rtl="0" eaLnBrk="0" fontAlgn="base" hangingPunct="0">
+              <a:spcBef>
+                <a:spcPct val="0"/>
+              </a:spcBef>
+              <a:spcAft>
+                <a:spcPct val="0"/>
+              </a:spcAft>
+              <a:defRPr sz="3200" b="1" cap="none" spc="0">
+                <a:ln w="18415" cmpd="sng">
+                  <a:solidFill>
+                    <a:srgbClr val="FFFFFF"/>
+                  </a:solidFill>
+                  <a:prstDash val="solid"/>
+                </a:ln>
+                <a:solidFill>
+                  <a:srgbClr val="FFFFFF"/>
+                </a:solidFill>
+                <a:effectLst>
+                  <a:outerShdw blurRad="63500" dir="3600000" algn="tl" rotWithShape="0">
+                    <a:srgbClr val="000000">
+                      <a:alpha val="70000"/>
+                    </a:srgbClr>
+                  </a:outerShdw>
+                </a:effectLst>
+                <a:latin typeface="+mj-lt"/>
+                <a:ea typeface="+mj-ea"/>
+                <a:cs typeface="+mj-cs"/>
+              </a:defRPr>
+            </a:lvl1pPr>
+            <a:lvl2pPr algn="ctr" rtl="0" eaLnBrk="0" fontAlgn="base" hangingPunct="0">
+              <a:spcBef>
+                <a:spcPct val="0"/>
+              </a:spcBef>
+              <a:spcAft>
+                <a:spcPct val="0"/>
+              </a:spcAft>
+              <a:defRPr sz="3600">
+                <a:solidFill>
+                  <a:schemeClr val="bg1"/>
+                </a:solidFill>
+                <a:latin typeface="Arial Black" pitchFamily="34" charset="0"/>
+                <a:cs typeface="Arial" charset="0"/>
+              </a:defRPr>
+            </a:lvl2pPr>
+            <a:lvl3pPr algn="ctr" rtl="0" eaLnBrk="0" fontAlgn="base" hangingPunct="0">
+              <a:spcBef>
+                <a:spcPct val="0"/>
+              </a:spcBef>
+              <a:spcAft>
+                <a:spcPct val="0"/>
+              </a:spcAft>
+              <a:defRPr sz="3600">
+                <a:solidFill>
+                  <a:schemeClr val="bg1"/>
+                </a:solidFill>
+                <a:latin typeface="Arial Black" pitchFamily="34" charset="0"/>
+                <a:cs typeface="Arial" charset="0"/>
+              </a:defRPr>
+            </a:lvl3pPr>
+            <a:lvl4pPr algn="ctr" rtl="0" eaLnBrk="0" fontAlgn="base" hangingPunct="0">
+              <a:spcBef>
+                <a:spcPct val="0"/>
+              </a:spcBef>
+              <a:spcAft>
+                <a:spcPct val="0"/>
+              </a:spcAft>
+              <a:defRPr sz="3600">
+                <a:solidFill>
+                  <a:schemeClr val="bg1"/>
+                </a:solidFill>
+                <a:latin typeface="Arial Black" pitchFamily="34" charset="0"/>
+                <a:cs typeface="Arial" charset="0"/>
+              </a:defRPr>
+            </a:lvl4pPr>
+            <a:lvl5pPr algn="ctr" rtl="0" eaLnBrk="0" fontAlgn="base" hangingPunct="0">
+              <a:spcBef>
+                <a:spcPct val="0"/>
+              </a:spcBef>
+              <a:spcAft>
+                <a:spcPct val="0"/>
+              </a:spcAft>
+              <a:defRPr sz="3600">
+                <a:solidFill>
+                  <a:schemeClr val="bg1"/>
+                </a:solidFill>
+                <a:latin typeface="Arial Black" pitchFamily="34" charset="0"/>
+                <a:cs typeface="Arial" charset="0"/>
+              </a:defRPr>
+            </a:lvl5pPr>
+            <a:lvl6pPr marL="457200" algn="ctr" rtl="0" fontAlgn="base">
+              <a:spcBef>
+                <a:spcPct val="0"/>
+              </a:spcBef>
+              <a:spcAft>
+                <a:spcPct val="0"/>
+              </a:spcAft>
+              <a:defRPr sz="3600">
+                <a:solidFill>
+                  <a:schemeClr val="bg1"/>
+                </a:solidFill>
+                <a:latin typeface="Arial Black" pitchFamily="34" charset="0"/>
+                <a:cs typeface="Arial" charset="0"/>
+              </a:defRPr>
+            </a:lvl6pPr>
+            <a:lvl7pPr marL="914400" algn="ctr" rtl="0" fontAlgn="base">
+              <a:spcBef>
+                <a:spcPct val="0"/>
+              </a:spcBef>
+              <a:spcAft>
+                <a:spcPct val="0"/>
+              </a:spcAft>
+              <a:defRPr sz="3600">
+                <a:solidFill>
+                  <a:schemeClr val="bg1"/>
+                </a:solidFill>
+                <a:latin typeface="Arial Black" pitchFamily="34" charset="0"/>
+                <a:cs typeface="Arial" charset="0"/>
+              </a:defRPr>
+            </a:lvl7pPr>
+            <a:lvl8pPr marL="1371600" algn="ctr" rtl="0" fontAlgn="base">
+              <a:spcBef>
+                <a:spcPct val="0"/>
+              </a:spcBef>
+              <a:spcAft>
+                <a:spcPct val="0"/>
+              </a:spcAft>
+              <a:defRPr sz="3600">
+                <a:solidFill>
+                  <a:schemeClr val="bg1"/>
+                </a:solidFill>
+                <a:latin typeface="Arial Black" pitchFamily="34" charset="0"/>
+                <a:cs typeface="Arial" charset="0"/>
+              </a:defRPr>
+            </a:lvl8pPr>
+            <a:lvl9pPr marL="1828800" algn="ctr" rtl="0" fontAlgn="base">
+              <a:spcBef>
+                <a:spcPct val="0"/>
+              </a:spcBef>
+              <a:spcAft>
+                <a:spcPct val="0"/>
+              </a:spcAft>
+              <a:defRPr sz="3600">
+                <a:solidFill>
+                  <a:schemeClr val="bg1"/>
+                </a:solidFill>
+                <a:latin typeface="Arial Black" pitchFamily="34" charset="0"/>
+                <a:cs typeface="Arial" charset="0"/>
+              </a:defRPr>
+            </a:lvl9pPr>
+          </a:lstStyle>
+          <a:p>
+            <a:pPr>
+              <a:defRPr sz="1800" b="1" i="0" u="none" strike="noStrike" kern="1200" baseline="0">
+                <a:solidFill>
+                  <a:srgbClr val="FFFFFF"/>
+                </a:solidFill>
+                <a:latin typeface="+mn-lt"/>
+                <a:ea typeface="+mn-ea"/>
+                <a:cs typeface="+mn-cs"/>
+              </a:defRPr>
+            </a:pPr>
+            <a:endParaRPr lang="en-US" dirty="0">
+              <a:solidFill>
+                <a:srgbClr val="FFFF00"/>
+              </a:solidFill>
+            </a:endParaRPr>
+          </a:p>
+        </p:txBody>
+      </p:sp>
+      <p:pic>
+        <p:nvPicPr>
+          <p:cNvPr id="5" name="Picture 4">
+            <a:extLst>
+              <a:ext uri="{FF2B5EF4-FFF2-40B4-BE49-F238E27FC236}">
+                <a16:creationId xmlns:a16="http://schemas.microsoft.com/office/drawing/2014/main" id="{F55B8FDD-121E-1E47-BF4E-C603C30DEF5D}"/>
+              </a:ext>
+            </a:extLst>
+          </p:cNvPr>
+          <p:cNvPicPr>
+            <a:picLocks noChangeAspect="1"/>
+          </p:cNvPicPr>
+          <p:nvPr/>
+        </p:nvPicPr>
+        <p:blipFill>
+          <a:blip r:embed="rId2">
+            <a:extLst>
+              <a:ext uri="{28A0092B-C50C-407E-A947-70E740481C1C}">
+                <a14:useLocalDpi xmlns:a14="http://schemas.microsoft.com/office/drawing/2010/main" val="0"/>
+              </a:ext>
+            </a:extLst>
+          </a:blip>
+          <a:stretch>
+            <a:fillRect/>
+          </a:stretch>
+        </p:blipFill>
+        <p:spPr>
+          <a:xfrm>
+            <a:off x="114300" y="2362200"/>
+            <a:ext cx="8915400" cy="3893266"/>
+          </a:xfrm>
+          <a:prstGeom prst="rect">
+            <a:avLst/>
+          </a:prstGeom>
+        </p:spPr>
+      </p:pic>
+    </p:spTree>
+    <p:extLst>
+      <p:ext uri="{BB962C8B-B14F-4D97-AF65-F5344CB8AC3E}">
+        <p14:creationId xmlns:p14="http://schemas.microsoft.com/office/powerpoint/2010/main" val="2501597143"/>
       </p:ext>
     </p:extLst>
   </p:cSld>

</xml_diff>